<commit_message>
Update Plant disease detection.pptx
</commit_message>
<xml_diff>
--- a/Plant disease detection.pptx
+++ b/Plant disease detection.pptx
@@ -19174,7 +19174,7 @@
         <p:spPr>
           <a:xfrm>
             <a:off x="5361272" y="558265"/>
-            <a:ext cx="5881917" cy="4812631"/>
+            <a:ext cx="5881917" cy="5467150"/>
           </a:xfrm>
         </p:spPr>
         <p:txBody>
@@ -19188,6 +19188,7 @@
             </a:endParaRPr>
           </a:p>
           <a:p>
+            <a:pPr algn="just"/>
             <a:r>
               <a:rPr lang="en-IN" b="1" dirty="0">
                 <a:latin typeface="Times New Roman" panose="02020603050405020304" pitchFamily="18" charset="0"/>
@@ -19226,6 +19227,7 @@
             </a:r>
           </a:p>
           <a:p>
+            <a:pPr algn="just"/>
             <a:r>
               <a:rPr lang="en-IN" sz="1400" dirty="0">
                 <a:effectLst/>
@@ -22734,7 +22736,7 @@
           <a:bodyPr/>
           <a:lstStyle/>
           <a:p>
-            <a:pPr marL="285750" indent="-285750">
+            <a:pPr marL="285750" indent="-285750" algn="just">
               <a:buFont typeface="Arial" panose="020B0604020202020204" pitchFamily="34" charset="0"/>
               <a:buChar char="•"/>
             </a:pPr>
@@ -22743,7 +22745,7 @@
                 <a:latin typeface="Times New Roman" panose="02020603050405020304" pitchFamily="18" charset="0"/>
                 <a:cs typeface="Times New Roman" panose="02020603050405020304" pitchFamily="18" charset="0"/>
               </a:rPr>
-              <a:t>The current method used to detect plant diseases is through naked eye, which is </a:t>
+              <a:t>The current method used to detect plant diseases is through the naked eye, which is </a:t>
             </a:r>
             <a:r>
               <a:rPr lang="en-IN" dirty="0">
@@ -22797,7 +22799,7 @@
         </p:nvSpPr>
         <p:spPr>
           <a:xfrm>
-            <a:off x="4794736" y="4463747"/>
+            <a:off x="4694492" y="4304371"/>
             <a:ext cx="5572007" cy="1306527"/>
           </a:xfrm>
         </p:spPr>
@@ -22805,7 +22807,7 @@
           <a:bodyPr/>
           <a:lstStyle/>
           <a:p>
-            <a:pPr marL="285750" indent="-285750">
+            <a:pPr marL="285750" indent="-285750" algn="just">
               <a:buFont typeface="Arial" panose="020B0604020202020204" pitchFamily="34" charset="0"/>
               <a:buChar char="•"/>
             </a:pPr>
@@ -22822,7 +22824,7 @@
                 <a:ea typeface="Calibri" panose="020F0502020204030204" pitchFamily="34" charset="0"/>
                 <a:cs typeface="Times New Roman" panose="02020603050405020304" pitchFamily="18" charset="0"/>
               </a:rPr>
-              <a:t>used few of the machine learning algorithms to categorize and identify the plant disease.</a:t>
+              <a:t>used a few of the machine learning algorithms to categorize and identify the plant disease.</a:t>
             </a:r>
             <a:endParaRPr lang="en-US" dirty="0">
               <a:latin typeface="Times New Roman" panose="02020603050405020304" pitchFamily="18" charset="0"/>
@@ -22855,7 +22857,7 @@
         </p:nvSpPr>
         <p:spPr>
           <a:xfrm>
-            <a:off x="4794737" y="2748622"/>
+            <a:off x="4739803" y="2457316"/>
             <a:ext cx="5242397" cy="1943367"/>
           </a:xfrm>
         </p:spPr>
@@ -22863,7 +22865,7 @@
           <a:bodyPr/>
           <a:lstStyle/>
           <a:p>
-            <a:pPr marL="285750" indent="-285750">
+            <a:pPr marL="285750" indent="-285750" algn="just">
               <a:buFont typeface="Arial" panose="020B0604020202020204" pitchFamily="34" charset="0"/>
               <a:buChar char="•"/>
             </a:pPr>
@@ -23109,7 +23111,7 @@
           <a:bodyPr/>
           <a:lstStyle/>
           <a:p>
-            <a:pPr marL="285750" indent="-285750">
+            <a:pPr marL="285750" indent="-285750" algn="just">
               <a:buFont typeface="Arial" panose="020B0604020202020204" pitchFamily="34" charset="0"/>
               <a:buChar char="•"/>
             </a:pPr>
@@ -23120,7 +23122,25 @@
                 <a:ea typeface="Calibri" panose="020F0502020204030204" pitchFamily="34" charset="0"/>
                 <a:cs typeface="Times New Roman" panose="02020603050405020304" pitchFamily="18" charset="0"/>
               </a:rPr>
-              <a:t>Our main goal is to identify and categorize plant diseases by analysing the leaf image data provided using the KNN, Fuzzy-KNN, and Bayesian SVM classification methods.</a:t>
+              <a:t>Our main goal is to identify and categorize plant diseases by </a:t>
+            </a:r>
+            <a:r>
+              <a:rPr lang="en-IN" dirty="0" err="1">
+                <a:effectLst/>
+                <a:latin typeface="Times New Roman" panose="02020603050405020304" pitchFamily="18" charset="0"/>
+                <a:ea typeface="Calibri" panose="020F0502020204030204" pitchFamily="34" charset="0"/>
+                <a:cs typeface="Times New Roman" panose="02020603050405020304" pitchFamily="18" charset="0"/>
+              </a:rPr>
+              <a:t>analyzing</a:t>
+            </a:r>
+            <a:r>
+              <a:rPr lang="en-IN" dirty="0">
+                <a:effectLst/>
+                <a:latin typeface="Times New Roman" panose="02020603050405020304" pitchFamily="18" charset="0"/>
+                <a:ea typeface="Calibri" panose="020F0502020204030204" pitchFamily="34" charset="0"/>
+                <a:cs typeface="Times New Roman" panose="02020603050405020304" pitchFamily="18" charset="0"/>
+              </a:rPr>
+              <a:t> the leaf image data provided using the KNN, Fuzzy-KNN, and Bayesian SVM classification methods.</a:t>
             </a:r>
           </a:p>
           <a:p>
@@ -23132,7 +23152,7 @@
             </a:endParaRPr>
           </a:p>
           <a:p>
-            <a:pPr marL="285750" indent="-285750">
+            <a:pPr marL="285750" indent="-285750" algn="just">
               <a:buFont typeface="Arial" panose="020B0604020202020204" pitchFamily="34" charset="0"/>
               <a:buChar char="•"/>
             </a:pPr>
@@ -23142,7 +23162,7 @@
                 <a:ea typeface="Calibri" panose="020F0502020204030204" pitchFamily="34" charset="0"/>
                 <a:cs typeface="Times New Roman" panose="02020603050405020304" pitchFamily="18" charset="0"/>
               </a:rPr>
-              <a:t> Our model should be able to identify the differences between the healthy and diseased plants with the highest possible accuracy.</a:t>
+              <a:t>Our model should be able to identify the differences between healthy and diseased plants with the highest possible accuracy.</a:t>
             </a:r>
             <a:endParaRPr lang="en-IN" dirty="0">
               <a:effectLst/>
@@ -24731,6 +24751,7 @@
             </a:r>
           </a:p>
           <a:p>
+            <a:pPr algn="just"/>
             <a:r>
               <a:rPr lang="en-US" b="1" dirty="0">
                 <a:latin typeface="Times New Roman" panose="02020603050405020304" pitchFamily="18" charset="0"/>
@@ -26095,34 +26116,6 @@
 </file>
 
 <file path=customXml/item1.xml><?xml version="1.0" encoding="utf-8"?>
-<p:properties xmlns:p="http://schemas.microsoft.com/office/2006/metadata/properties" xmlns:xsi="http://www.w3.org/2001/XMLSchema-instance" xmlns:pc="http://schemas.microsoft.com/office/infopath/2007/PartnerControls">
-  <documentManagement>
-    <_ip_UnifiedCompliancePolicyUIAction xmlns="http://schemas.microsoft.com/sharepoint/v3" xsi:nil="true"/>
-    <Image xmlns="71af3243-3dd4-4a8d-8c0d-dd76da1f02a5">
-      <Url xsi:nil="true"/>
-      <Description xsi:nil="true"/>
-    </Image>
-    <Status xmlns="71af3243-3dd4-4a8d-8c0d-dd76da1f02a5">Not started</Status>
-    <_ip_UnifiedCompliancePolicyProperties xmlns="http://schemas.microsoft.com/sharepoint/v3" xsi:nil="true"/>
-    <ImageTagsTaxHTField xmlns="71af3243-3dd4-4a8d-8c0d-dd76da1f02a5">
-      <Terms xmlns="http://schemas.microsoft.com/office/infopath/2007/PartnerControls"/>
-    </ImageTagsTaxHTField>
-    <TaxCatchAll xmlns="230e9df3-be65-4c73-a93b-d1236ebd677e"/>
-    <MediaServiceKeyPoints xmlns="71af3243-3dd4-4a8d-8c0d-dd76da1f02a5" xsi:nil="true"/>
-  </documentManagement>
-</p:properties>
-</file>
-
-<file path=customXml/item2.xml><?xml version="1.0" encoding="utf-8"?>
-<?mso-contentType ?>
-<FormTemplates xmlns="http://schemas.microsoft.com/sharepoint/v3/contenttype/forms">
-  <Display>DocumentLibraryForm</Display>
-  <Edit>DocumentLibraryForm</Edit>
-  <New>DocumentLibraryForm</New>
-</FormTemplates>
-</file>
-
-<file path=customXml/item3.xml><?xml version="1.0" encoding="utf-8"?>
 <ct:contentTypeSchema xmlns:ct="http://schemas.microsoft.com/office/2006/metadata/contentType" xmlns:ma="http://schemas.microsoft.com/office/2006/metadata/properties/metaAttributes" ct:_="" ma:_="" ma:contentTypeName="Document" ma:contentTypeID="0x01010079F111ED35F8CC479449609E8A0923A6" ma:contentTypeVersion="20" ma:contentTypeDescription="Create a new document." ma:contentTypeScope="" ma:versionID="1267097ee5f5874adfcc408041ae252e">
   <xsd:schema xmlns:xsd="http://www.w3.org/2001/XMLSchema" xmlns:xs="http://www.w3.org/2001/XMLSchema" xmlns:p="http://schemas.microsoft.com/office/2006/metadata/properties" xmlns:ns1="http://schemas.microsoft.com/sharepoint/v3" xmlns:ns2="71af3243-3dd4-4a8d-8c0d-dd76da1f02a5" xmlns:ns3="16c05727-aa75-4e4a-9b5f-8a80a1165891" xmlns:ns4="230e9df3-be65-4c73-a93b-d1236ebd677e" targetNamespace="http://schemas.microsoft.com/office/2006/metadata/properties" ma:root="true" ma:fieldsID="395891a93df65b14727750f2c06c306c" ns1:_="" ns2:_="" ns3:_="" ns4:_="">
     <xsd:import namespace="http://schemas.microsoft.com/sharepoint/v3"/>
@@ -26398,27 +26391,35 @@
 </ct:contentTypeSchema>
 </file>
 
-<file path=customXml/itemProps1.xml><?xml version="1.0" encoding="utf-8"?>
-<ds:datastoreItem xmlns:ds="http://schemas.openxmlformats.org/officeDocument/2006/customXml" ds:itemID="{0E439292-23DE-4FBC-B000-AFED89AC64F3}">
-  <ds:schemaRefs>
-    <ds:schemaRef ds:uri="http://schemas.microsoft.com/office/2006/metadata/properties"/>
-    <ds:schemaRef ds:uri="http://schemas.microsoft.com/office/infopath/2007/PartnerControls"/>
-    <ds:schemaRef ds:uri="http://schemas.microsoft.com/sharepoint/v3"/>
-    <ds:schemaRef ds:uri="71af3243-3dd4-4a8d-8c0d-dd76da1f02a5"/>
-    <ds:schemaRef ds:uri="230e9df3-be65-4c73-a93b-d1236ebd677e"/>
-  </ds:schemaRefs>
-</ds:datastoreItem>
+<file path=customXml/item2.xml><?xml version="1.0" encoding="utf-8"?>
+<?mso-contentType ?>
+<FormTemplates xmlns="http://schemas.microsoft.com/sharepoint/v3/contenttype/forms">
+  <Display>DocumentLibraryForm</Display>
+  <Edit>DocumentLibraryForm</Edit>
+  <New>DocumentLibraryForm</New>
+</FormTemplates>
 </file>
 
-<file path=customXml/itemProps2.xml><?xml version="1.0" encoding="utf-8"?>
-<ds:datastoreItem xmlns:ds="http://schemas.openxmlformats.org/officeDocument/2006/customXml" ds:itemID="{5F1B15C2-B622-4464-872A-FFB13E3A35CE}">
-  <ds:schemaRefs>
-    <ds:schemaRef ds:uri="http://schemas.microsoft.com/sharepoint/v3/contenttype/forms"/>
-  </ds:schemaRefs>
-</ds:datastoreItem>
+<file path=customXml/item3.xml><?xml version="1.0" encoding="utf-8"?>
+<p:properties xmlns:p="http://schemas.microsoft.com/office/2006/metadata/properties" xmlns:xsi="http://www.w3.org/2001/XMLSchema-instance" xmlns:pc="http://schemas.microsoft.com/office/infopath/2007/PartnerControls">
+  <documentManagement>
+    <_ip_UnifiedCompliancePolicyUIAction xmlns="http://schemas.microsoft.com/sharepoint/v3" xsi:nil="true"/>
+    <Image xmlns="71af3243-3dd4-4a8d-8c0d-dd76da1f02a5">
+      <Url xsi:nil="true"/>
+      <Description xsi:nil="true"/>
+    </Image>
+    <Status xmlns="71af3243-3dd4-4a8d-8c0d-dd76da1f02a5">Not started</Status>
+    <_ip_UnifiedCompliancePolicyProperties xmlns="http://schemas.microsoft.com/sharepoint/v3" xsi:nil="true"/>
+    <ImageTagsTaxHTField xmlns="71af3243-3dd4-4a8d-8c0d-dd76da1f02a5">
+      <Terms xmlns="http://schemas.microsoft.com/office/infopath/2007/PartnerControls"/>
+    </ImageTagsTaxHTField>
+    <TaxCatchAll xmlns="230e9df3-be65-4c73-a93b-d1236ebd677e"/>
+    <MediaServiceKeyPoints xmlns="71af3243-3dd4-4a8d-8c0d-dd76da1f02a5" xsi:nil="true"/>
+  </documentManagement>
+</p:properties>
 </file>
 
-<file path=customXml/itemProps3.xml><?xml version="1.0" encoding="utf-8"?>
+<file path=customXml/itemProps1.xml><?xml version="1.0" encoding="utf-8"?>
 <ds:datastoreItem xmlns:ds="http://schemas.openxmlformats.org/officeDocument/2006/customXml" ds:itemID="{065F1115-A9D1-4ADF-878E-8B9CEB141684}">
   <ds:schemaRefs>
     <ds:schemaRef ds:uri="http://schemas.microsoft.com/office/2006/metadata/contentType"/>
@@ -26439,6 +26440,26 @@
 </ds:datastoreItem>
 </file>
 
+<file path=customXml/itemProps2.xml><?xml version="1.0" encoding="utf-8"?>
+<ds:datastoreItem xmlns:ds="http://schemas.openxmlformats.org/officeDocument/2006/customXml" ds:itemID="{5F1B15C2-B622-4464-872A-FFB13E3A35CE}">
+  <ds:schemaRefs>
+    <ds:schemaRef ds:uri="http://schemas.microsoft.com/sharepoint/v3/contenttype/forms"/>
+  </ds:schemaRefs>
+</ds:datastoreItem>
+</file>
+
+<file path=customXml/itemProps3.xml><?xml version="1.0" encoding="utf-8"?>
+<ds:datastoreItem xmlns:ds="http://schemas.openxmlformats.org/officeDocument/2006/customXml" ds:itemID="{0E439292-23DE-4FBC-B000-AFED89AC64F3}">
+  <ds:schemaRefs>
+    <ds:schemaRef ds:uri="http://schemas.microsoft.com/office/2006/metadata/properties"/>
+    <ds:schemaRef ds:uri="http://schemas.microsoft.com/office/infopath/2007/PartnerControls"/>
+    <ds:schemaRef ds:uri="http://schemas.microsoft.com/sharepoint/v3"/>
+    <ds:schemaRef ds:uri="71af3243-3dd4-4a8d-8c0d-dd76da1f02a5"/>
+    <ds:schemaRef ds:uri="230e9df3-be65-4c73-a93b-d1236ebd677e"/>
+  </ds:schemaRefs>
+</ds:datastoreItem>
+</file>
+
 <file path=docMetadata/LabelInfo.xml><?xml version="1.0" encoding="utf-8"?>
 <clbl:labelList xmlns:clbl="http://schemas.microsoft.com/office/2020/mipLabelMetadata">
   <clbl:label id="{f42aa342-8706-4288-bd11-ebb85995028c}" enabled="1" method="Standard" siteId="{72f988bf-86f1-41af-91ab-2d7cd011db47}" removed="0"/>

</xml_diff>